<commit_message>
Date: 19 Dec 2025
</commit_message>
<xml_diff>
--- a/Data Driven Framework.pptx
+++ b/Data Driven Framework.pptx
@@ -10,6 +10,7 @@
     <p:sldId id="258" r:id="rId4"/>
     <p:sldId id="259" r:id="rId5"/>
     <p:sldId id="260" r:id="rId6"/>
+    <p:sldId id="261" r:id="rId7"/>
   </p:sldIdLst>
   <p:sldSz cx="12192000" cy="6858000"/>
   <p:notesSz cx="6858000" cy="9144000"/>
@@ -108,6 +109,11 @@
       </a:defRPr>
     </a:lvl9pPr>
   </p:defaultTextStyle>
+  <p:extLst>
+    <p:ext uri="{EFAFB233-063F-42B5-8137-9DF3F51BA10A}">
+      <p15:sldGuideLst xmlns:p15="http://schemas.microsoft.com/office/powerpoint/2012/main"/>
+    </p:ext>
+  </p:extLst>
 </p:presentation>
 </file>
 
@@ -1810,14 +1816,35 @@
         </dgm:presLayoutVars>
       </dgm:prSet>
       <dgm:spPr/>
+      <dgm:t>
+        <a:bodyPr/>
+        <a:lstStyle/>
+        <a:p>
+          <a:endParaRPr lang="en-IN"/>
+        </a:p>
+      </dgm:t>
     </dgm:pt>
     <dgm:pt modelId="{A051639C-6792-4B2F-9B6B-7F1186788154}" type="pres">
       <dgm:prSet presAssocID="{EB3C1D2E-4287-4A3F-8DF2-582F080DE05E}" presName="sibTrans" presStyleLbl="sibTrans2D1" presStyleIdx="0" presStyleCnt="3"/>
       <dgm:spPr/>
+      <dgm:t>
+        <a:bodyPr/>
+        <a:lstStyle/>
+        <a:p>
+          <a:endParaRPr lang="en-IN"/>
+        </a:p>
+      </dgm:t>
     </dgm:pt>
     <dgm:pt modelId="{EDA6B0F8-3DBF-4E97-8BB6-37D36127457A}" type="pres">
       <dgm:prSet presAssocID="{EB3C1D2E-4287-4A3F-8DF2-582F080DE05E}" presName="connectorText" presStyleLbl="sibTrans2D1" presStyleIdx="0" presStyleCnt="3"/>
       <dgm:spPr/>
+      <dgm:t>
+        <a:bodyPr/>
+        <a:lstStyle/>
+        <a:p>
+          <a:endParaRPr lang="en-IN"/>
+        </a:p>
+      </dgm:t>
     </dgm:pt>
     <dgm:pt modelId="{9F671FB8-5E2F-448F-BC60-608924A8C5B7}" type="pres">
       <dgm:prSet presAssocID="{CE58B131-CC72-43AF-A68D-B1BD52B249D2}" presName="node" presStyleLbl="node1" presStyleIdx="1" presStyleCnt="4">
@@ -1826,14 +1853,35 @@
         </dgm:presLayoutVars>
       </dgm:prSet>
       <dgm:spPr/>
+      <dgm:t>
+        <a:bodyPr/>
+        <a:lstStyle/>
+        <a:p>
+          <a:endParaRPr lang="en-IN"/>
+        </a:p>
+      </dgm:t>
     </dgm:pt>
     <dgm:pt modelId="{BFC48236-8027-49B6-A7F4-185F1694BB41}" type="pres">
       <dgm:prSet presAssocID="{3CF9196E-8B8C-480B-B11B-2D76C00326BD}" presName="sibTrans" presStyleLbl="sibTrans2D1" presStyleIdx="1" presStyleCnt="3"/>
       <dgm:spPr/>
+      <dgm:t>
+        <a:bodyPr/>
+        <a:lstStyle/>
+        <a:p>
+          <a:endParaRPr lang="en-IN"/>
+        </a:p>
+      </dgm:t>
     </dgm:pt>
     <dgm:pt modelId="{FF20E1BA-4186-4245-8CC3-CF13061593E4}" type="pres">
       <dgm:prSet presAssocID="{3CF9196E-8B8C-480B-B11B-2D76C00326BD}" presName="connectorText" presStyleLbl="sibTrans2D1" presStyleIdx="1" presStyleCnt="3"/>
       <dgm:spPr/>
+      <dgm:t>
+        <a:bodyPr/>
+        <a:lstStyle/>
+        <a:p>
+          <a:endParaRPr lang="en-IN"/>
+        </a:p>
+      </dgm:t>
     </dgm:pt>
     <dgm:pt modelId="{1BE5B7C9-2D1A-4474-8E5D-DB86DF015B2B}" type="pres">
       <dgm:prSet presAssocID="{BCF3127F-0B8F-4F7C-9BB3-6EAFDC2CA739}" presName="node" presStyleLbl="node1" presStyleIdx="2" presStyleCnt="4">
@@ -1853,10 +1901,24 @@
     <dgm:pt modelId="{4E290B49-BB18-4FE2-BA0D-3719F1B1F591}" type="pres">
       <dgm:prSet presAssocID="{0CCBCA76-3473-4F50-AF7E-4DE739F4F1D4}" presName="sibTrans" presStyleLbl="sibTrans2D1" presStyleIdx="2" presStyleCnt="3"/>
       <dgm:spPr/>
+      <dgm:t>
+        <a:bodyPr/>
+        <a:lstStyle/>
+        <a:p>
+          <a:endParaRPr lang="en-IN"/>
+        </a:p>
+      </dgm:t>
     </dgm:pt>
     <dgm:pt modelId="{DE0DD438-7E7A-4036-B057-D9284653927A}" type="pres">
       <dgm:prSet presAssocID="{0CCBCA76-3473-4F50-AF7E-4DE739F4F1D4}" presName="connectorText" presStyleLbl="sibTrans2D1" presStyleIdx="2" presStyleCnt="3"/>
       <dgm:spPr/>
+      <dgm:t>
+        <a:bodyPr/>
+        <a:lstStyle/>
+        <a:p>
+          <a:endParaRPr lang="en-IN"/>
+        </a:p>
+      </dgm:t>
     </dgm:pt>
     <dgm:pt modelId="{3494DFB0-D507-4C9D-AF0B-F82FF34DAB80}" type="pres">
       <dgm:prSet presAssocID="{7A8CF538-08FC-4AA7-93B8-BDF638F07056}" presName="node" presStyleLbl="node1" presStyleIdx="3" presStyleCnt="4">
@@ -1865,24 +1927,31 @@
         </dgm:presLayoutVars>
       </dgm:prSet>
       <dgm:spPr/>
+      <dgm:t>
+        <a:bodyPr/>
+        <a:lstStyle/>
+        <a:p>
+          <a:endParaRPr lang="en-IN"/>
+        </a:p>
+      </dgm:t>
     </dgm:pt>
   </dgm:ptLst>
   <dgm:cxnLst>
+    <dgm:cxn modelId="{4CF0EF57-0FF4-44F5-9726-230376D8715E}" srcId="{3EB7E629-8CA1-45A5-81C0-6AF48CA5B8AD}" destId="{BCF3127F-0B8F-4F7C-9BB3-6EAFDC2CA739}" srcOrd="2" destOrd="0" parTransId="{2EEC6749-10C9-41FD-99B7-5F59C04A94F9}" sibTransId="{0CCBCA76-3473-4F50-AF7E-4DE739F4F1D4}"/>
+    <dgm:cxn modelId="{6C5E4294-A92A-456E-A5F8-CEEC305032C1}" type="presOf" srcId="{0CCBCA76-3473-4F50-AF7E-4DE739F4F1D4}" destId="{DE0DD438-7E7A-4036-B057-D9284653927A}" srcOrd="1" destOrd="0" presId="urn:microsoft.com/office/officeart/2005/8/layout/process2"/>
+    <dgm:cxn modelId="{E9941447-B60D-40FE-B60C-FF2F5F9DF161}" type="presOf" srcId="{7A8CF538-08FC-4AA7-93B8-BDF638F07056}" destId="{3494DFB0-D507-4C9D-AF0B-F82FF34DAB80}" srcOrd="0" destOrd="0" presId="urn:microsoft.com/office/officeart/2005/8/layout/process2"/>
+    <dgm:cxn modelId="{5A5FBAD6-1A45-4A9F-950F-36EBE771FC1C}" srcId="{3EB7E629-8CA1-45A5-81C0-6AF48CA5B8AD}" destId="{CE58B131-CC72-43AF-A68D-B1BD52B249D2}" srcOrd="1" destOrd="0" parTransId="{17427CA9-5EBE-4F7A-A9BF-323174B22CF1}" sibTransId="{3CF9196E-8B8C-480B-B11B-2D76C00326BD}"/>
+    <dgm:cxn modelId="{20CBC3AB-9653-4F95-90E7-7D3D606CBABF}" type="presOf" srcId="{3CF9196E-8B8C-480B-B11B-2D76C00326BD}" destId="{FF20E1BA-4186-4245-8CC3-CF13061593E4}" srcOrd="1" destOrd="0" presId="urn:microsoft.com/office/officeart/2005/8/layout/process2"/>
     <dgm:cxn modelId="{966C61BD-B19B-4C38-AA36-CEED1D771B5F}" type="presOf" srcId="{0CCBCA76-3473-4F50-AF7E-4DE739F4F1D4}" destId="{4E290B49-BB18-4FE2-BA0D-3719F1B1F591}" srcOrd="0" destOrd="0" presId="urn:microsoft.com/office/officeart/2005/8/layout/process2"/>
-    <dgm:cxn modelId="{6C5E4294-A92A-456E-A5F8-CEEC305032C1}" type="presOf" srcId="{0CCBCA76-3473-4F50-AF7E-4DE739F4F1D4}" destId="{DE0DD438-7E7A-4036-B057-D9284653927A}" srcOrd="1" destOrd="0" presId="urn:microsoft.com/office/officeart/2005/8/layout/process2"/>
-    <dgm:cxn modelId="{4CF0EF57-0FF4-44F5-9726-230376D8715E}" srcId="{3EB7E629-8CA1-45A5-81C0-6AF48CA5B8AD}" destId="{BCF3127F-0B8F-4F7C-9BB3-6EAFDC2CA739}" srcOrd="2" destOrd="0" parTransId="{2EEC6749-10C9-41FD-99B7-5F59C04A94F9}" sibTransId="{0CCBCA76-3473-4F50-AF7E-4DE739F4F1D4}"/>
-    <dgm:cxn modelId="{E9941447-B60D-40FE-B60C-FF2F5F9DF161}" type="presOf" srcId="{7A8CF538-08FC-4AA7-93B8-BDF638F07056}" destId="{3494DFB0-D507-4C9D-AF0B-F82FF34DAB80}" srcOrd="0" destOrd="0" presId="urn:microsoft.com/office/officeart/2005/8/layout/process2"/>
+    <dgm:cxn modelId="{DBB14A65-337C-474C-9F8E-6C49298FA9D2}" srcId="{3EB7E629-8CA1-45A5-81C0-6AF48CA5B8AD}" destId="{330AABF4-69D9-47ED-BB9B-AA2B0BA55FDF}" srcOrd="0" destOrd="0" parTransId="{D333E3FE-8956-428F-9A44-2C6D8FDD6FE3}" sibTransId="{EB3C1D2E-4287-4A3F-8DF2-582F080DE05E}"/>
+    <dgm:cxn modelId="{E7EBF25F-2271-46B6-9504-0EDCED26703D}" type="presOf" srcId="{330AABF4-69D9-47ED-BB9B-AA2B0BA55FDF}" destId="{24637020-0D0B-41EB-92F6-B515D36706CE}" srcOrd="0" destOrd="0" presId="urn:microsoft.com/office/officeart/2005/8/layout/process2"/>
+    <dgm:cxn modelId="{96F091CE-85CE-47A4-BE55-36A21E404E05}" type="presOf" srcId="{EB3C1D2E-4287-4A3F-8DF2-582F080DE05E}" destId="{A051639C-6792-4B2F-9B6B-7F1186788154}" srcOrd="0" destOrd="0" presId="urn:microsoft.com/office/officeart/2005/8/layout/process2"/>
+    <dgm:cxn modelId="{9D5CDBA4-BE56-4BA5-BC30-383879FCDD31}" type="presOf" srcId="{3CF9196E-8B8C-480B-B11B-2D76C00326BD}" destId="{BFC48236-8027-49B6-A7F4-185F1694BB41}" srcOrd="0" destOrd="0" presId="urn:microsoft.com/office/officeart/2005/8/layout/process2"/>
+    <dgm:cxn modelId="{D1CFC676-C562-493B-A5D1-8BC539AFAD20}" type="presOf" srcId="{EB3C1D2E-4287-4A3F-8DF2-582F080DE05E}" destId="{EDA6B0F8-3DBF-4E97-8BB6-37D36127457A}" srcOrd="1" destOrd="0" presId="urn:microsoft.com/office/officeart/2005/8/layout/process2"/>
+    <dgm:cxn modelId="{2947391B-165C-4E98-9F59-35FF72900001}" type="presOf" srcId="{3EB7E629-8CA1-45A5-81C0-6AF48CA5B8AD}" destId="{599DD744-E004-48BF-AD78-067D9E7E1472}" srcOrd="0" destOrd="0" presId="urn:microsoft.com/office/officeart/2005/8/layout/process2"/>
+    <dgm:cxn modelId="{3FD9B5F1-5EFE-42DC-A425-1B24ED9C49D3}" type="presOf" srcId="{CE58B131-CC72-43AF-A68D-B1BD52B249D2}" destId="{9F671FB8-5E2F-448F-BC60-608924A8C5B7}" srcOrd="0" destOrd="0" presId="urn:microsoft.com/office/officeart/2005/8/layout/process2"/>
     <dgm:cxn modelId="{A0CD59AD-8FB0-4A8C-9415-D1CB1EA27924}" srcId="{3EB7E629-8CA1-45A5-81C0-6AF48CA5B8AD}" destId="{7A8CF538-08FC-4AA7-93B8-BDF638F07056}" srcOrd="3" destOrd="0" parTransId="{F4B022F4-2DCA-47D1-A860-0542082B3650}" sibTransId="{1184D9CA-C700-4CD2-AFE3-183426292A4F}"/>
     <dgm:cxn modelId="{89776DF7-5341-4635-8835-527E5FBC6F2A}" type="presOf" srcId="{BCF3127F-0B8F-4F7C-9BB3-6EAFDC2CA739}" destId="{1BE5B7C9-2D1A-4474-8E5D-DB86DF015B2B}" srcOrd="0" destOrd="0" presId="urn:microsoft.com/office/officeart/2005/8/layout/process2"/>
-    <dgm:cxn modelId="{5A5FBAD6-1A45-4A9F-950F-36EBE771FC1C}" srcId="{3EB7E629-8CA1-45A5-81C0-6AF48CA5B8AD}" destId="{CE58B131-CC72-43AF-A68D-B1BD52B249D2}" srcOrd="1" destOrd="0" parTransId="{17427CA9-5EBE-4F7A-A9BF-323174B22CF1}" sibTransId="{3CF9196E-8B8C-480B-B11B-2D76C00326BD}"/>
-    <dgm:cxn modelId="{96F091CE-85CE-47A4-BE55-36A21E404E05}" type="presOf" srcId="{EB3C1D2E-4287-4A3F-8DF2-582F080DE05E}" destId="{A051639C-6792-4B2F-9B6B-7F1186788154}" srcOrd="0" destOrd="0" presId="urn:microsoft.com/office/officeart/2005/8/layout/process2"/>
-    <dgm:cxn modelId="{DBB14A65-337C-474C-9F8E-6C49298FA9D2}" srcId="{3EB7E629-8CA1-45A5-81C0-6AF48CA5B8AD}" destId="{330AABF4-69D9-47ED-BB9B-AA2B0BA55FDF}" srcOrd="0" destOrd="0" parTransId="{D333E3FE-8956-428F-9A44-2C6D8FDD6FE3}" sibTransId="{EB3C1D2E-4287-4A3F-8DF2-582F080DE05E}"/>
-    <dgm:cxn modelId="{3FD9B5F1-5EFE-42DC-A425-1B24ED9C49D3}" type="presOf" srcId="{CE58B131-CC72-43AF-A68D-B1BD52B249D2}" destId="{9F671FB8-5E2F-448F-BC60-608924A8C5B7}" srcOrd="0" destOrd="0" presId="urn:microsoft.com/office/officeart/2005/8/layout/process2"/>
-    <dgm:cxn modelId="{20CBC3AB-9653-4F95-90E7-7D3D606CBABF}" type="presOf" srcId="{3CF9196E-8B8C-480B-B11B-2D76C00326BD}" destId="{FF20E1BA-4186-4245-8CC3-CF13061593E4}" srcOrd="1" destOrd="0" presId="urn:microsoft.com/office/officeart/2005/8/layout/process2"/>
-    <dgm:cxn modelId="{E7EBF25F-2271-46B6-9504-0EDCED26703D}" type="presOf" srcId="{330AABF4-69D9-47ED-BB9B-AA2B0BA55FDF}" destId="{24637020-0D0B-41EB-92F6-B515D36706CE}" srcOrd="0" destOrd="0" presId="urn:microsoft.com/office/officeart/2005/8/layout/process2"/>
-    <dgm:cxn modelId="{D1CFC676-C562-493B-A5D1-8BC539AFAD20}" type="presOf" srcId="{EB3C1D2E-4287-4A3F-8DF2-582F080DE05E}" destId="{EDA6B0F8-3DBF-4E97-8BB6-37D36127457A}" srcOrd="1" destOrd="0" presId="urn:microsoft.com/office/officeart/2005/8/layout/process2"/>
-    <dgm:cxn modelId="{2947391B-165C-4E98-9F59-35FF72900001}" type="presOf" srcId="{3EB7E629-8CA1-45A5-81C0-6AF48CA5B8AD}" destId="{599DD744-E004-48BF-AD78-067D9E7E1472}" srcOrd="0" destOrd="0" presId="urn:microsoft.com/office/officeart/2005/8/layout/process2"/>
-    <dgm:cxn modelId="{9D5CDBA4-BE56-4BA5-BC30-383879FCDD31}" type="presOf" srcId="{3CF9196E-8B8C-480B-B11B-2D76C00326BD}" destId="{BFC48236-8027-49B6-A7F4-185F1694BB41}" srcOrd="0" destOrd="0" presId="urn:microsoft.com/office/officeart/2005/8/layout/process2"/>
     <dgm:cxn modelId="{5958BDED-5154-48ED-B475-91FE6354B1D2}" type="presParOf" srcId="{599DD744-E004-48BF-AD78-067D9E7E1472}" destId="{24637020-0D0B-41EB-92F6-B515D36706CE}" srcOrd="0" destOrd="0" presId="urn:microsoft.com/office/officeart/2005/8/layout/process2"/>
     <dgm:cxn modelId="{7B5DB43B-1571-4C9B-8886-BE2B69C12D0A}" type="presParOf" srcId="{599DD744-E004-48BF-AD78-067D9E7E1472}" destId="{A051639C-6792-4B2F-9B6B-7F1186788154}" srcOrd="1" destOrd="0" presId="urn:microsoft.com/office/officeart/2005/8/layout/process2"/>
     <dgm:cxn modelId="{438033E7-207D-48A8-A6D5-B41F1780A07E}" type="presParOf" srcId="{A051639C-6792-4B2F-9B6B-7F1186788154}" destId="{EDA6B0F8-3DBF-4E97-8BB6-37D36127457A}" srcOrd="0" destOrd="0" presId="urn:microsoft.com/office/officeart/2005/8/layout/process2"/>
@@ -2004,6 +2073,13 @@
         </dgm:presLayoutVars>
       </dgm:prSet>
       <dgm:spPr/>
+      <dgm:t>
+        <a:bodyPr/>
+        <a:lstStyle/>
+        <a:p>
+          <a:endParaRPr lang="en-IN"/>
+        </a:p>
+      </dgm:t>
     </dgm:pt>
     <dgm:pt modelId="{D9FA836D-F037-42B7-8752-49E8C72852B8}" type="pres">
       <dgm:prSet presAssocID="{40E68C61-D516-443F-B256-4EA59F299E38}" presName="parTxOnlySpace" presStyleCnt="0"/>
@@ -2018,6 +2094,13 @@
         </dgm:presLayoutVars>
       </dgm:prSet>
       <dgm:spPr/>
+      <dgm:t>
+        <a:bodyPr/>
+        <a:lstStyle/>
+        <a:p>
+          <a:endParaRPr lang="en-IN"/>
+        </a:p>
+      </dgm:t>
     </dgm:pt>
   </dgm:ptLst>
   <dgm:cxnLst>
@@ -5960,7 +6043,7 @@
           <a:p>
             <a:fld id="{00E3B183-6507-45DB-80D5-5A8699002234}" type="datetimeFigureOut">
               <a:rPr lang="en-IN" smtClean="0"/>
-              <a:t>18-12-2025</a:t>
+              <a:t>19-12-2025</a:t>
             </a:fld>
             <a:endParaRPr lang="en-IN"/>
           </a:p>
@@ -6211,7 +6294,7 @@
           <a:p>
             <a:fld id="{00E3B183-6507-45DB-80D5-5A8699002234}" type="datetimeFigureOut">
               <a:rPr lang="en-IN" smtClean="0"/>
-              <a:t>18-12-2025</a:t>
+              <a:t>19-12-2025</a:t>
             </a:fld>
             <a:endParaRPr lang="en-IN"/>
           </a:p>
@@ -6525,7 +6608,7 @@
           <a:p>
             <a:fld id="{00E3B183-6507-45DB-80D5-5A8699002234}" type="datetimeFigureOut">
               <a:rPr lang="en-IN" smtClean="0"/>
-              <a:t>18-12-2025</a:t>
+              <a:t>19-12-2025</a:t>
             </a:fld>
             <a:endParaRPr lang="en-IN"/>
           </a:p>
@@ -6866,7 +6949,7 @@
           <a:p>
             <a:fld id="{00E3B183-6507-45DB-80D5-5A8699002234}" type="datetimeFigureOut">
               <a:rPr lang="en-IN" smtClean="0"/>
-              <a:t>18-12-2025</a:t>
+              <a:t>19-12-2025</a:t>
             </a:fld>
             <a:endParaRPr lang="en-IN"/>
           </a:p>
@@ -7180,7 +7263,7 @@
           <a:p>
             <a:fld id="{00E3B183-6507-45DB-80D5-5A8699002234}" type="datetimeFigureOut">
               <a:rPr lang="en-IN" smtClean="0"/>
-              <a:t>18-12-2025</a:t>
+              <a:t>19-12-2025</a:t>
             </a:fld>
             <a:endParaRPr lang="en-IN"/>
           </a:p>
@@ -7573,7 +7656,7 @@
           <a:p>
             <a:fld id="{00E3B183-6507-45DB-80D5-5A8699002234}" type="datetimeFigureOut">
               <a:rPr lang="en-IN" smtClean="0"/>
-              <a:t>18-12-2025</a:t>
+              <a:t>19-12-2025</a:t>
             </a:fld>
             <a:endParaRPr lang="en-IN"/>
           </a:p>
@@ -7743,7 +7826,7 @@
           <a:p>
             <a:fld id="{00E3B183-6507-45DB-80D5-5A8699002234}" type="datetimeFigureOut">
               <a:rPr lang="en-IN" smtClean="0"/>
-              <a:t>18-12-2025</a:t>
+              <a:t>19-12-2025</a:t>
             </a:fld>
             <a:endParaRPr lang="en-IN"/>
           </a:p>
@@ -7923,7 +8006,7 @@
           <a:p>
             <a:fld id="{00E3B183-6507-45DB-80D5-5A8699002234}" type="datetimeFigureOut">
               <a:rPr lang="en-IN" smtClean="0"/>
-              <a:t>18-12-2025</a:t>
+              <a:t>19-12-2025</a:t>
             </a:fld>
             <a:endParaRPr lang="en-IN"/>
           </a:p>
@@ -8099,7 +8182,7 @@
           <a:p>
             <a:fld id="{00E3B183-6507-45DB-80D5-5A8699002234}" type="datetimeFigureOut">
               <a:rPr lang="en-IN" smtClean="0"/>
-              <a:t>18-12-2025</a:t>
+              <a:t>19-12-2025</a:t>
             </a:fld>
             <a:endParaRPr lang="en-IN"/>
           </a:p>
@@ -8346,7 +8429,7 @@
           <a:p>
             <a:fld id="{00E3B183-6507-45DB-80D5-5A8699002234}" type="datetimeFigureOut">
               <a:rPr lang="en-IN" smtClean="0"/>
-              <a:t>18-12-2025</a:t>
+              <a:t>19-12-2025</a:t>
             </a:fld>
             <a:endParaRPr lang="en-IN"/>
           </a:p>
@@ -8578,7 +8661,7 @@
           <a:p>
             <a:fld id="{00E3B183-6507-45DB-80D5-5A8699002234}" type="datetimeFigureOut">
               <a:rPr lang="en-IN" smtClean="0"/>
-              <a:t>18-12-2025</a:t>
+              <a:t>19-12-2025</a:t>
             </a:fld>
             <a:endParaRPr lang="en-IN"/>
           </a:p>
@@ -8952,7 +9035,7 @@
           <a:p>
             <a:fld id="{00E3B183-6507-45DB-80D5-5A8699002234}" type="datetimeFigureOut">
               <a:rPr lang="en-IN" smtClean="0"/>
-              <a:t>18-12-2025</a:t>
+              <a:t>19-12-2025</a:t>
             </a:fld>
             <a:endParaRPr lang="en-IN"/>
           </a:p>
@@ -9075,7 +9158,7 @@
           <a:p>
             <a:fld id="{00E3B183-6507-45DB-80D5-5A8699002234}" type="datetimeFigureOut">
               <a:rPr lang="en-IN" smtClean="0"/>
-              <a:t>18-12-2025</a:t>
+              <a:t>19-12-2025</a:t>
             </a:fld>
             <a:endParaRPr lang="en-IN"/>
           </a:p>
@@ -9170,7 +9253,7 @@
           <a:p>
             <a:fld id="{00E3B183-6507-45DB-80D5-5A8699002234}" type="datetimeFigureOut">
               <a:rPr lang="en-IN" smtClean="0"/>
-              <a:t>18-12-2025</a:t>
+              <a:t>19-12-2025</a:t>
             </a:fld>
             <a:endParaRPr lang="en-IN"/>
           </a:p>
@@ -9425,7 +9508,7 @@
           <a:p>
             <a:fld id="{00E3B183-6507-45DB-80D5-5A8699002234}" type="datetimeFigureOut">
               <a:rPr lang="en-IN" smtClean="0"/>
-              <a:t>18-12-2025</a:t>
+              <a:t>19-12-2025</a:t>
             </a:fld>
             <a:endParaRPr lang="en-IN"/>
           </a:p>
@@ -9688,7 +9771,7 @@
           <a:p>
             <a:fld id="{00E3B183-6507-45DB-80D5-5A8699002234}" type="datetimeFigureOut">
               <a:rPr lang="en-IN" smtClean="0"/>
-              <a:t>18-12-2025</a:t>
+              <a:t>19-12-2025</a:t>
             </a:fld>
             <a:endParaRPr lang="en-IN"/>
           </a:p>
@@ -10431,7 +10514,7 @@
           <a:p>
             <a:fld id="{00E3B183-6507-45DB-80D5-5A8699002234}" type="datetimeFigureOut">
               <a:rPr lang="en-IN" smtClean="0"/>
-              <a:t>18-12-2025</a:t>
+              <a:t>19-12-2025</a:t>
             </a:fld>
             <a:endParaRPr lang="en-IN"/>
           </a:p>
@@ -11576,8 +11659,8 @@
           <a:p>
             <a:pPr algn="ctr"/>
             <a:r>
-              <a:rPr lang="en-US" dirty="0" smtClean="0"/>
-              <a:t>API</a:t>
+              <a:rPr lang="en-US" smtClean="0"/>
+              <a:t>(API)</a:t>
             </a:r>
             <a:endParaRPr lang="en-IN" dirty="0"/>
           </a:p>
@@ -11758,6 +11841,914 @@
     <p:extLst>
       <p:ext uri="{BB962C8B-B14F-4D97-AF65-F5344CB8AC3E}">
         <p14:creationId xmlns:p14="http://schemas.microsoft.com/office/powerpoint/2010/main" val="3166173516"/>
+      </p:ext>
+    </p:extLst>
+  </p:cSld>
+  <p:clrMapOvr>
+    <a:masterClrMapping/>
+  </p:clrMapOvr>
+</p:sld>
+</file>
+
+<file path=ppt/slides/slide6.xml><?xml version="1.0" encoding="utf-8"?>
+<p:sld xmlns:a="http://schemas.openxmlformats.org/drawingml/2006/main" xmlns:r="http://schemas.openxmlformats.org/officeDocument/2006/relationships" xmlns:p="http://schemas.openxmlformats.org/presentationml/2006/main">
+  <p:cSld>
+    <p:spTree>
+      <p:nvGrpSpPr>
+        <p:cNvPr id="1" name=""/>
+        <p:cNvGrpSpPr/>
+        <p:nvPr/>
+      </p:nvGrpSpPr>
+      <p:grpSpPr>
+        <a:xfrm>
+          <a:off x="0" y="0"/>
+          <a:ext cx="0" cy="0"/>
+          <a:chOff x="0" y="0"/>
+          <a:chExt cx="0" cy="0"/>
+        </a:xfrm>
+      </p:grpSpPr>
+      <p:graphicFrame>
+        <p:nvGraphicFramePr>
+          <p:cNvPr id="4" name="Table 3"/>
+          <p:cNvGraphicFramePr>
+            <a:graphicFrameLocks noGrp="1"/>
+          </p:cNvGraphicFramePr>
+          <p:nvPr>
+            <p:extLst>
+              <p:ext uri="{D42A27DB-BD31-4B8C-83A1-F6EECF244321}">
+                <p14:modId xmlns:p14="http://schemas.microsoft.com/office/powerpoint/2010/main" val="2468894581"/>
+              </p:ext>
+            </p:extLst>
+          </p:nvPr>
+        </p:nvGraphicFramePr>
+        <p:xfrm>
+          <a:off x="98735" y="523005"/>
+          <a:ext cx="5619484" cy="1986915"/>
+        </p:xfrm>
+        <a:graphic>
+          <a:graphicData uri="http://schemas.openxmlformats.org/drawingml/2006/table">
+            <a:tbl>
+              <a:tblPr>
+                <a:tableStyleId>{5C22544A-7EE6-4342-B048-85BDC9FD1C3A}</a:tableStyleId>
+              </a:tblPr>
+              <a:tblGrid>
+                <a:gridCol w="1404871"/>
+                <a:gridCol w="1404871"/>
+                <a:gridCol w="1404871"/>
+                <a:gridCol w="1404871"/>
+              </a:tblGrid>
+              <a:tr h="190500">
+                <a:tc>
+                  <a:txBody>
+                    <a:bodyPr/>
+                    <a:lstStyle/>
+                    <a:p>
+                      <a:pPr algn="l" fontAlgn="b"/>
+                      <a:r>
+                        <a:rPr lang="en-IN" sz="1800" u="none" strike="noStrike" dirty="0">
+                          <a:effectLst/>
+                        </a:rPr>
+                        <a:t>User Name</a:t>
+                      </a:r>
+                      <a:endParaRPr lang="en-IN" sz="1800" b="0" i="0" u="none" strike="noStrike" dirty="0">
+                        <a:solidFill>
+                          <a:srgbClr val="000000"/>
+                        </a:solidFill>
+                        <a:effectLst/>
+                        <a:latin typeface="Calibri" panose="020F0502020204030204" pitchFamily="34" charset="0"/>
+                      </a:endParaRPr>
+                    </a:p>
+                  </a:txBody>
+                  <a:tcPr marL="9525" marR="9525" marT="9525" marB="0" anchor="b"/>
+                </a:tc>
+                <a:tc>
+                  <a:txBody>
+                    <a:bodyPr/>
+                    <a:lstStyle/>
+                    <a:p>
+                      <a:pPr algn="l" fontAlgn="b"/>
+                      <a:r>
+                        <a:rPr lang="en-IN" sz="1800" u="none" strike="noStrike" dirty="0">
+                          <a:effectLst/>
+                        </a:rPr>
+                        <a:t>Password</a:t>
+                      </a:r>
+                      <a:endParaRPr lang="en-IN" sz="1800" b="0" i="0" u="none" strike="noStrike" dirty="0">
+                        <a:solidFill>
+                          <a:srgbClr val="000000"/>
+                        </a:solidFill>
+                        <a:effectLst/>
+                        <a:latin typeface="Calibri" panose="020F0502020204030204" pitchFamily="34" charset="0"/>
+                      </a:endParaRPr>
+                    </a:p>
+                  </a:txBody>
+                  <a:tcPr marL="9525" marR="9525" marT="9525" marB="0" anchor="b"/>
+                </a:tc>
+                <a:tc>
+                  <a:txBody>
+                    <a:bodyPr/>
+                    <a:lstStyle/>
+                    <a:p>
+                      <a:pPr algn="l" fontAlgn="b"/>
+                      <a:r>
+                        <a:rPr lang="en-IN" sz="1800" u="none" strike="noStrike" dirty="0">
+                          <a:effectLst/>
+                        </a:rPr>
+                        <a:t>Result</a:t>
+                      </a:r>
+                      <a:endParaRPr lang="en-IN" sz="1800" b="0" i="0" u="none" strike="noStrike" dirty="0">
+                        <a:solidFill>
+                          <a:srgbClr val="000000"/>
+                        </a:solidFill>
+                        <a:effectLst/>
+                        <a:latin typeface="Calibri" panose="020F0502020204030204" pitchFamily="34" charset="0"/>
+                      </a:endParaRPr>
+                    </a:p>
+                  </a:txBody>
+                  <a:tcPr marL="9525" marR="9525" marT="9525" marB="0" anchor="b"/>
+                </a:tc>
+                <a:tc>
+                  <a:txBody>
+                    <a:bodyPr/>
+                    <a:lstStyle/>
+                    <a:p>
+                      <a:pPr algn="l" fontAlgn="b"/>
+                      <a:r>
+                        <a:rPr lang="en-IN" sz="1800" u="none" strike="noStrike">
+                          <a:effectLst/>
+                        </a:rPr>
+                        <a:t>Message</a:t>
+                      </a:r>
+                      <a:endParaRPr lang="en-IN" sz="1800" b="0" i="0" u="none" strike="noStrike">
+                        <a:solidFill>
+                          <a:srgbClr val="000000"/>
+                        </a:solidFill>
+                        <a:effectLst/>
+                        <a:latin typeface="Calibri" panose="020F0502020204030204" pitchFamily="34" charset="0"/>
+                      </a:endParaRPr>
+                    </a:p>
+                  </a:txBody>
+                  <a:tcPr marL="9525" marR="9525" marT="9525" marB="0" anchor="b"/>
+                </a:tc>
+              </a:tr>
+              <a:tr h="190500">
+                <a:tc>
+                  <a:txBody>
+                    <a:bodyPr/>
+                    <a:lstStyle/>
+                    <a:p>
+                      <a:pPr algn="l" fontAlgn="b"/>
+                      <a:r>
+                        <a:rPr lang="en-IN" sz="1800" u="none" strike="noStrike" dirty="0">
+                          <a:effectLst/>
+                        </a:rPr>
+                        <a:t>admin</a:t>
+                      </a:r>
+                      <a:endParaRPr lang="en-IN" sz="1800" b="0" i="0" u="none" strike="noStrike" dirty="0">
+                        <a:solidFill>
+                          <a:srgbClr val="000000"/>
+                        </a:solidFill>
+                        <a:effectLst/>
+                        <a:latin typeface="Calibri" panose="020F0502020204030204" pitchFamily="34" charset="0"/>
+                      </a:endParaRPr>
+                    </a:p>
+                  </a:txBody>
+                  <a:tcPr marL="9525" marR="9525" marT="9525" marB="0" anchor="b"/>
+                </a:tc>
+                <a:tc>
+                  <a:txBody>
+                    <a:bodyPr/>
+                    <a:lstStyle/>
+                    <a:p>
+                      <a:pPr algn="l" fontAlgn="b"/>
+                      <a:r>
+                        <a:rPr lang="en-IN" sz="1800" u="none" strike="noStrike">
+                          <a:effectLst/>
+                        </a:rPr>
+                        <a:t>admin123</a:t>
+                      </a:r>
+                      <a:endParaRPr lang="en-IN" sz="1800" b="0" i="0" u="none" strike="noStrike">
+                        <a:solidFill>
+                          <a:srgbClr val="000000"/>
+                        </a:solidFill>
+                        <a:effectLst/>
+                        <a:latin typeface="Calibri" panose="020F0502020204030204" pitchFamily="34" charset="0"/>
+                      </a:endParaRPr>
+                    </a:p>
+                  </a:txBody>
+                  <a:tcPr marL="9525" marR="9525" marT="9525" marB="0" anchor="b"/>
+                </a:tc>
+                <a:tc>
+                  <a:txBody>
+                    <a:bodyPr/>
+                    <a:lstStyle/>
+                    <a:p>
+                      <a:pPr algn="l" fontAlgn="b"/>
+                      <a:r>
+                        <a:rPr lang="en-IN" sz="1800" u="none" strike="noStrike">
+                          <a:effectLst/>
+                        </a:rPr>
+                        <a:t>Not Run</a:t>
+                      </a:r>
+                      <a:endParaRPr lang="en-IN" sz="1800" b="0" i="0" u="none" strike="noStrike">
+                        <a:solidFill>
+                          <a:srgbClr val="000000"/>
+                        </a:solidFill>
+                        <a:effectLst/>
+                        <a:latin typeface="Calibri" panose="020F0502020204030204" pitchFamily="34" charset="0"/>
+                      </a:endParaRPr>
+                    </a:p>
+                  </a:txBody>
+                  <a:tcPr marL="9525" marR="9525" marT="9525" marB="0" anchor="b"/>
+                </a:tc>
+                <a:tc>
+                  <a:txBody>
+                    <a:bodyPr/>
+                    <a:lstStyle/>
+                    <a:p>
+                      <a:pPr algn="l" fontAlgn="b"/>
+                      <a:r>
+                        <a:rPr lang="en-IN" sz="1800" u="none" strike="noStrike">
+                          <a:effectLst/>
+                        </a:rPr>
+                        <a:t>NULL</a:t>
+                      </a:r>
+                      <a:endParaRPr lang="en-IN" sz="1800" b="0" i="0" u="none" strike="noStrike">
+                        <a:solidFill>
+                          <a:srgbClr val="000000"/>
+                        </a:solidFill>
+                        <a:effectLst/>
+                        <a:latin typeface="Calibri" panose="020F0502020204030204" pitchFamily="34" charset="0"/>
+                      </a:endParaRPr>
+                    </a:p>
+                  </a:txBody>
+                  <a:tcPr marL="9525" marR="9525" marT="9525" marB="0" anchor="b"/>
+                </a:tc>
+              </a:tr>
+              <a:tr h="190500">
+                <a:tc>
+                  <a:txBody>
+                    <a:bodyPr/>
+                    <a:lstStyle/>
+                    <a:p>
+                      <a:pPr algn="l" fontAlgn="b"/>
+                      <a:r>
+                        <a:rPr lang="en-IN" sz="1800" u="none" strike="noStrike">
+                          <a:effectLst/>
+                        </a:rPr>
+                        <a:t>shashikant</a:t>
+                      </a:r>
+                      <a:endParaRPr lang="en-IN" sz="1800" b="0" i="0" u="none" strike="noStrike">
+                        <a:solidFill>
+                          <a:srgbClr val="000000"/>
+                        </a:solidFill>
+                        <a:effectLst/>
+                        <a:latin typeface="Calibri" panose="020F0502020204030204" pitchFamily="34" charset="0"/>
+                      </a:endParaRPr>
+                    </a:p>
+                  </a:txBody>
+                  <a:tcPr marL="9525" marR="9525" marT="9525" marB="0" anchor="b"/>
+                </a:tc>
+                <a:tc>
+                  <a:txBody>
+                    <a:bodyPr/>
+                    <a:lstStyle/>
+                    <a:p>
+                      <a:pPr algn="l" fontAlgn="b"/>
+                      <a:r>
+                        <a:rPr lang="en-IN" sz="1800" u="none" strike="noStrike">
+                          <a:effectLst/>
+                        </a:rPr>
+                        <a:t>shahi123</a:t>
+                      </a:r>
+                      <a:endParaRPr lang="en-IN" sz="1800" b="0" i="0" u="none" strike="noStrike">
+                        <a:solidFill>
+                          <a:srgbClr val="000000"/>
+                        </a:solidFill>
+                        <a:effectLst/>
+                        <a:latin typeface="Calibri" panose="020F0502020204030204" pitchFamily="34" charset="0"/>
+                      </a:endParaRPr>
+                    </a:p>
+                  </a:txBody>
+                  <a:tcPr marL="9525" marR="9525" marT="9525" marB="0" anchor="b"/>
+                </a:tc>
+                <a:tc>
+                  <a:txBody>
+                    <a:bodyPr/>
+                    <a:lstStyle/>
+                    <a:p>
+                      <a:pPr algn="l" fontAlgn="b"/>
+                      <a:r>
+                        <a:rPr lang="en-IN" sz="1800" u="none" strike="noStrike">
+                          <a:effectLst/>
+                        </a:rPr>
+                        <a:t>Not Run</a:t>
+                      </a:r>
+                      <a:endParaRPr lang="en-IN" sz="1800" b="0" i="0" u="none" strike="noStrike">
+                        <a:solidFill>
+                          <a:srgbClr val="000000"/>
+                        </a:solidFill>
+                        <a:effectLst/>
+                        <a:latin typeface="Calibri" panose="020F0502020204030204" pitchFamily="34" charset="0"/>
+                      </a:endParaRPr>
+                    </a:p>
+                  </a:txBody>
+                  <a:tcPr marL="9525" marR="9525" marT="9525" marB="0" anchor="b"/>
+                </a:tc>
+                <a:tc>
+                  <a:txBody>
+                    <a:bodyPr/>
+                    <a:lstStyle/>
+                    <a:p>
+                      <a:pPr algn="l" fontAlgn="b"/>
+                      <a:r>
+                        <a:rPr lang="en-IN" sz="1800" u="none" strike="noStrike">
+                          <a:effectLst/>
+                        </a:rPr>
+                        <a:t>NULL</a:t>
+                      </a:r>
+                      <a:endParaRPr lang="en-IN" sz="1800" b="0" i="0" u="none" strike="noStrike">
+                        <a:solidFill>
+                          <a:srgbClr val="000000"/>
+                        </a:solidFill>
+                        <a:effectLst/>
+                        <a:latin typeface="Calibri" panose="020F0502020204030204" pitchFamily="34" charset="0"/>
+                      </a:endParaRPr>
+                    </a:p>
+                  </a:txBody>
+                  <a:tcPr marL="9525" marR="9525" marT="9525" marB="0" anchor="b"/>
+                </a:tc>
+              </a:tr>
+              <a:tr h="190500">
+                <a:tc>
+                  <a:txBody>
+                    <a:bodyPr/>
+                    <a:lstStyle/>
+                    <a:p>
+                      <a:pPr algn="l" fontAlgn="b"/>
+                      <a:r>
+                        <a:rPr lang="en-IN" sz="1800" u="none" strike="noStrike">
+                          <a:effectLst/>
+                        </a:rPr>
+                        <a:t>neha</a:t>
+                      </a:r>
+                      <a:endParaRPr lang="en-IN" sz="1800" b="0" i="0" u="none" strike="noStrike">
+                        <a:solidFill>
+                          <a:srgbClr val="000000"/>
+                        </a:solidFill>
+                        <a:effectLst/>
+                        <a:latin typeface="Calibri" panose="020F0502020204030204" pitchFamily="34" charset="0"/>
+                      </a:endParaRPr>
+                    </a:p>
+                  </a:txBody>
+                  <a:tcPr marL="9525" marR="9525" marT="9525" marB="0" anchor="b"/>
+                </a:tc>
+                <a:tc>
+                  <a:txBody>
+                    <a:bodyPr/>
+                    <a:lstStyle/>
+                    <a:p>
+                      <a:pPr algn="l" fontAlgn="b"/>
+                      <a:r>
+                        <a:rPr lang="en-IN" sz="1800" u="none" strike="noStrike">
+                          <a:effectLst/>
+                        </a:rPr>
+                        <a:t>neha123</a:t>
+                      </a:r>
+                      <a:endParaRPr lang="en-IN" sz="1800" b="0" i="0" u="none" strike="noStrike">
+                        <a:solidFill>
+                          <a:srgbClr val="000000"/>
+                        </a:solidFill>
+                        <a:effectLst/>
+                        <a:latin typeface="Calibri" panose="020F0502020204030204" pitchFamily="34" charset="0"/>
+                      </a:endParaRPr>
+                    </a:p>
+                  </a:txBody>
+                  <a:tcPr marL="9525" marR="9525" marT="9525" marB="0" anchor="b"/>
+                </a:tc>
+                <a:tc>
+                  <a:txBody>
+                    <a:bodyPr/>
+                    <a:lstStyle/>
+                    <a:p>
+                      <a:pPr algn="l" fontAlgn="b"/>
+                      <a:r>
+                        <a:rPr lang="en-IN" sz="1800" u="none" strike="noStrike">
+                          <a:effectLst/>
+                        </a:rPr>
+                        <a:t>Not Run</a:t>
+                      </a:r>
+                      <a:endParaRPr lang="en-IN" sz="1800" b="0" i="0" u="none" strike="noStrike">
+                        <a:solidFill>
+                          <a:srgbClr val="000000"/>
+                        </a:solidFill>
+                        <a:effectLst/>
+                        <a:latin typeface="Calibri" panose="020F0502020204030204" pitchFamily="34" charset="0"/>
+                      </a:endParaRPr>
+                    </a:p>
+                  </a:txBody>
+                  <a:tcPr marL="9525" marR="9525" marT="9525" marB="0" anchor="b"/>
+                </a:tc>
+                <a:tc>
+                  <a:txBody>
+                    <a:bodyPr/>
+                    <a:lstStyle/>
+                    <a:p>
+                      <a:pPr algn="l" fontAlgn="b"/>
+                      <a:r>
+                        <a:rPr lang="en-IN" sz="1800" u="none" strike="noStrike">
+                          <a:effectLst/>
+                        </a:rPr>
+                        <a:t>NULL</a:t>
+                      </a:r>
+                      <a:endParaRPr lang="en-IN" sz="1800" b="0" i="0" u="none" strike="noStrike">
+                        <a:solidFill>
+                          <a:srgbClr val="000000"/>
+                        </a:solidFill>
+                        <a:effectLst/>
+                        <a:latin typeface="Calibri" panose="020F0502020204030204" pitchFamily="34" charset="0"/>
+                      </a:endParaRPr>
+                    </a:p>
+                  </a:txBody>
+                  <a:tcPr marL="9525" marR="9525" marT="9525" marB="0" anchor="b"/>
+                </a:tc>
+              </a:tr>
+              <a:tr h="190500">
+                <a:tc>
+                  <a:txBody>
+                    <a:bodyPr/>
+                    <a:lstStyle/>
+                    <a:p>
+                      <a:pPr algn="l" fontAlgn="b"/>
+                      <a:r>
+                        <a:rPr lang="en-IN" sz="1800" u="none" strike="noStrike">
+                          <a:effectLst/>
+                        </a:rPr>
+                        <a:t>admin</a:t>
+                      </a:r>
+                      <a:endParaRPr lang="en-IN" sz="1800" b="0" i="0" u="none" strike="noStrike">
+                        <a:solidFill>
+                          <a:srgbClr val="000000"/>
+                        </a:solidFill>
+                        <a:effectLst/>
+                        <a:latin typeface="Calibri" panose="020F0502020204030204" pitchFamily="34" charset="0"/>
+                      </a:endParaRPr>
+                    </a:p>
+                  </a:txBody>
+                  <a:tcPr marL="9525" marR="9525" marT="9525" marB="0" anchor="b"/>
+                </a:tc>
+                <a:tc>
+                  <a:txBody>
+                    <a:bodyPr/>
+                    <a:lstStyle/>
+                    <a:p>
+                      <a:pPr algn="l" fontAlgn="b"/>
+                      <a:r>
+                        <a:rPr lang="en-IN" sz="1800" u="none" strike="noStrike">
+                          <a:effectLst/>
+                        </a:rPr>
+                        <a:t>admin123</a:t>
+                      </a:r>
+                      <a:endParaRPr lang="en-IN" sz="1800" b="0" i="0" u="none" strike="noStrike">
+                        <a:solidFill>
+                          <a:srgbClr val="000000"/>
+                        </a:solidFill>
+                        <a:effectLst/>
+                        <a:latin typeface="Calibri" panose="020F0502020204030204" pitchFamily="34" charset="0"/>
+                      </a:endParaRPr>
+                    </a:p>
+                  </a:txBody>
+                  <a:tcPr marL="9525" marR="9525" marT="9525" marB="0" anchor="b"/>
+                </a:tc>
+                <a:tc>
+                  <a:txBody>
+                    <a:bodyPr/>
+                    <a:lstStyle/>
+                    <a:p>
+                      <a:pPr algn="l" fontAlgn="b"/>
+                      <a:r>
+                        <a:rPr lang="en-IN" sz="1800" u="none" strike="noStrike">
+                          <a:effectLst/>
+                        </a:rPr>
+                        <a:t>Not Run</a:t>
+                      </a:r>
+                      <a:endParaRPr lang="en-IN" sz="1800" b="0" i="0" u="none" strike="noStrike">
+                        <a:solidFill>
+                          <a:srgbClr val="000000"/>
+                        </a:solidFill>
+                        <a:effectLst/>
+                        <a:latin typeface="Calibri" panose="020F0502020204030204" pitchFamily="34" charset="0"/>
+                      </a:endParaRPr>
+                    </a:p>
+                  </a:txBody>
+                  <a:tcPr marL="9525" marR="9525" marT="9525" marB="0" anchor="b"/>
+                </a:tc>
+                <a:tc>
+                  <a:txBody>
+                    <a:bodyPr/>
+                    <a:lstStyle/>
+                    <a:p>
+                      <a:pPr algn="l" fontAlgn="b"/>
+                      <a:r>
+                        <a:rPr lang="en-IN" sz="1800" u="none" strike="noStrike">
+                          <a:effectLst/>
+                        </a:rPr>
+                        <a:t>NULL</a:t>
+                      </a:r>
+                      <a:endParaRPr lang="en-IN" sz="1800" b="0" i="0" u="none" strike="noStrike">
+                        <a:solidFill>
+                          <a:srgbClr val="000000"/>
+                        </a:solidFill>
+                        <a:effectLst/>
+                        <a:latin typeface="Calibri" panose="020F0502020204030204" pitchFamily="34" charset="0"/>
+                      </a:endParaRPr>
+                    </a:p>
+                  </a:txBody>
+                  <a:tcPr marL="9525" marR="9525" marT="9525" marB="0" anchor="b"/>
+                </a:tc>
+              </a:tr>
+              <a:tr h="190500">
+                <a:tc>
+                  <a:txBody>
+                    <a:bodyPr/>
+                    <a:lstStyle/>
+                    <a:p>
+                      <a:pPr algn="l" fontAlgn="b"/>
+                      <a:r>
+                        <a:rPr lang="en-IN" sz="1800" u="none" strike="noStrike">
+                          <a:effectLst/>
+                        </a:rPr>
+                        <a:t>varsha</a:t>
+                      </a:r>
+                      <a:endParaRPr lang="en-IN" sz="1800" b="0" i="0" u="none" strike="noStrike">
+                        <a:solidFill>
+                          <a:srgbClr val="000000"/>
+                        </a:solidFill>
+                        <a:effectLst/>
+                        <a:latin typeface="Calibri" panose="020F0502020204030204" pitchFamily="34" charset="0"/>
+                      </a:endParaRPr>
+                    </a:p>
+                  </a:txBody>
+                  <a:tcPr marL="9525" marR="9525" marT="9525" marB="0" anchor="b"/>
+                </a:tc>
+                <a:tc>
+                  <a:txBody>
+                    <a:bodyPr/>
+                    <a:lstStyle/>
+                    <a:p>
+                      <a:pPr algn="l" fontAlgn="b"/>
+                      <a:r>
+                        <a:rPr lang="en-IN" sz="1800" u="none" strike="noStrike">
+                          <a:effectLst/>
+                        </a:rPr>
+                        <a:t>varsha123</a:t>
+                      </a:r>
+                      <a:endParaRPr lang="en-IN" sz="1800" b="0" i="0" u="none" strike="noStrike">
+                        <a:solidFill>
+                          <a:srgbClr val="000000"/>
+                        </a:solidFill>
+                        <a:effectLst/>
+                        <a:latin typeface="Calibri" panose="020F0502020204030204" pitchFamily="34" charset="0"/>
+                      </a:endParaRPr>
+                    </a:p>
+                  </a:txBody>
+                  <a:tcPr marL="9525" marR="9525" marT="9525" marB="0" anchor="b"/>
+                </a:tc>
+                <a:tc>
+                  <a:txBody>
+                    <a:bodyPr/>
+                    <a:lstStyle/>
+                    <a:p>
+                      <a:pPr algn="l" fontAlgn="b"/>
+                      <a:r>
+                        <a:rPr lang="en-IN" sz="1800" u="none" strike="noStrike">
+                          <a:effectLst/>
+                        </a:rPr>
+                        <a:t>Not Run</a:t>
+                      </a:r>
+                      <a:endParaRPr lang="en-IN" sz="1800" b="0" i="0" u="none" strike="noStrike">
+                        <a:solidFill>
+                          <a:srgbClr val="000000"/>
+                        </a:solidFill>
+                        <a:effectLst/>
+                        <a:latin typeface="Calibri" panose="020F0502020204030204" pitchFamily="34" charset="0"/>
+                      </a:endParaRPr>
+                    </a:p>
+                  </a:txBody>
+                  <a:tcPr marL="9525" marR="9525" marT="9525" marB="0" anchor="b"/>
+                </a:tc>
+                <a:tc>
+                  <a:txBody>
+                    <a:bodyPr/>
+                    <a:lstStyle/>
+                    <a:p>
+                      <a:pPr algn="l" fontAlgn="b"/>
+                      <a:r>
+                        <a:rPr lang="en-IN" sz="1800" u="none" strike="noStrike">
+                          <a:effectLst/>
+                        </a:rPr>
+                        <a:t>NULL</a:t>
+                      </a:r>
+                      <a:endParaRPr lang="en-IN" sz="1800" b="0" i="0" u="none" strike="noStrike">
+                        <a:solidFill>
+                          <a:srgbClr val="000000"/>
+                        </a:solidFill>
+                        <a:effectLst/>
+                        <a:latin typeface="Calibri" panose="020F0502020204030204" pitchFamily="34" charset="0"/>
+                      </a:endParaRPr>
+                    </a:p>
+                  </a:txBody>
+                  <a:tcPr marL="9525" marR="9525" marT="9525" marB="0" anchor="b"/>
+                </a:tc>
+              </a:tr>
+              <a:tr h="190500">
+                <a:tc>
+                  <a:txBody>
+                    <a:bodyPr/>
+                    <a:lstStyle/>
+                    <a:p>
+                      <a:pPr algn="l" fontAlgn="b"/>
+                      <a:r>
+                        <a:rPr lang="en-IN" sz="1800" u="none" strike="noStrike">
+                          <a:effectLst/>
+                        </a:rPr>
+                        <a:t>admin</a:t>
+                      </a:r>
+                      <a:endParaRPr lang="en-IN" sz="1800" b="0" i="0" u="none" strike="noStrike">
+                        <a:solidFill>
+                          <a:srgbClr val="000000"/>
+                        </a:solidFill>
+                        <a:effectLst/>
+                        <a:latin typeface="Calibri" panose="020F0502020204030204" pitchFamily="34" charset="0"/>
+                      </a:endParaRPr>
+                    </a:p>
+                  </a:txBody>
+                  <a:tcPr marL="9525" marR="9525" marT="9525" marB="0" anchor="b"/>
+                </a:tc>
+                <a:tc>
+                  <a:txBody>
+                    <a:bodyPr/>
+                    <a:lstStyle/>
+                    <a:p>
+                      <a:pPr algn="l" fontAlgn="b"/>
+                      <a:r>
+                        <a:rPr lang="en-IN" sz="1800" u="none" strike="noStrike">
+                          <a:effectLst/>
+                        </a:rPr>
+                        <a:t>admin123</a:t>
+                      </a:r>
+                      <a:endParaRPr lang="en-IN" sz="1800" b="0" i="0" u="none" strike="noStrike">
+                        <a:solidFill>
+                          <a:srgbClr val="000000"/>
+                        </a:solidFill>
+                        <a:effectLst/>
+                        <a:latin typeface="Calibri" panose="020F0502020204030204" pitchFamily="34" charset="0"/>
+                      </a:endParaRPr>
+                    </a:p>
+                  </a:txBody>
+                  <a:tcPr marL="9525" marR="9525" marT="9525" marB="0" anchor="b"/>
+                </a:tc>
+                <a:tc>
+                  <a:txBody>
+                    <a:bodyPr/>
+                    <a:lstStyle/>
+                    <a:p>
+                      <a:pPr algn="l" fontAlgn="b"/>
+                      <a:r>
+                        <a:rPr lang="en-IN" sz="1800" u="none" strike="noStrike" dirty="0">
+                          <a:effectLst/>
+                        </a:rPr>
+                        <a:t>Not Run</a:t>
+                      </a:r>
+                      <a:endParaRPr lang="en-IN" sz="1800" b="0" i="0" u="none" strike="noStrike" dirty="0">
+                        <a:solidFill>
+                          <a:srgbClr val="000000"/>
+                        </a:solidFill>
+                        <a:effectLst/>
+                        <a:latin typeface="Calibri" panose="020F0502020204030204" pitchFamily="34" charset="0"/>
+                      </a:endParaRPr>
+                    </a:p>
+                  </a:txBody>
+                  <a:tcPr marL="9525" marR="9525" marT="9525" marB="0" anchor="b"/>
+                </a:tc>
+                <a:tc>
+                  <a:txBody>
+                    <a:bodyPr/>
+                    <a:lstStyle/>
+                    <a:p>
+                      <a:pPr algn="l" fontAlgn="b"/>
+                      <a:r>
+                        <a:rPr lang="en-IN" sz="1800" u="none" strike="noStrike" dirty="0">
+                          <a:effectLst/>
+                        </a:rPr>
+                        <a:t>NULL</a:t>
+                      </a:r>
+                      <a:endParaRPr lang="en-IN" sz="1800" b="0" i="0" u="none" strike="noStrike" dirty="0">
+                        <a:solidFill>
+                          <a:srgbClr val="000000"/>
+                        </a:solidFill>
+                        <a:effectLst/>
+                        <a:latin typeface="Calibri" panose="020F0502020204030204" pitchFamily="34" charset="0"/>
+                      </a:endParaRPr>
+                    </a:p>
+                  </a:txBody>
+                  <a:tcPr marL="9525" marR="9525" marT="9525" marB="0" anchor="b"/>
+                </a:tc>
+              </a:tr>
+            </a:tbl>
+          </a:graphicData>
+        </a:graphic>
+      </p:graphicFrame>
+      <p:graphicFrame>
+        <p:nvGraphicFramePr>
+          <p:cNvPr id="5" name="Table 4"/>
+          <p:cNvGraphicFramePr>
+            <a:graphicFrameLocks noGrp="1"/>
+          </p:cNvGraphicFramePr>
+          <p:nvPr>
+            <p:extLst>
+              <p:ext uri="{D42A27DB-BD31-4B8C-83A1-F6EECF244321}">
+                <p14:modId xmlns:p14="http://schemas.microsoft.com/office/powerpoint/2010/main" val="2059294276"/>
+              </p:ext>
+            </p:extLst>
+          </p:nvPr>
+        </p:nvGraphicFramePr>
+        <p:xfrm>
+          <a:off x="344867" y="3128015"/>
+          <a:ext cx="4064000" cy="2595880"/>
+        </p:xfrm>
+        <a:graphic>
+          <a:graphicData uri="http://schemas.openxmlformats.org/drawingml/2006/table">
+            <a:tbl>
+              <a:tblPr firstRow="1" bandRow="1">
+                <a:tableStyleId>{5940675A-B579-460E-94D1-54222C63F5DA}</a:tableStyleId>
+              </a:tblPr>
+              <a:tblGrid>
+                <a:gridCol w="2032000"/>
+                <a:gridCol w="2032000"/>
+              </a:tblGrid>
+              <a:tr h="370840">
+                <a:tc>
+                  <a:txBody>
+                    <a:bodyPr/>
+                    <a:lstStyle/>
+                    <a:p>
+                      <a:endParaRPr lang="en-IN" dirty="0"/>
+                    </a:p>
+                  </a:txBody>
+                  <a:tcPr/>
+                </a:tc>
+                <a:tc>
+                  <a:txBody>
+                    <a:bodyPr/>
+                    <a:lstStyle/>
+                    <a:p>
+                      <a:endParaRPr lang="en-IN" dirty="0"/>
+                    </a:p>
+                  </a:txBody>
+                  <a:tcPr/>
+                </a:tc>
+              </a:tr>
+              <a:tr h="370840">
+                <a:tc>
+                  <a:txBody>
+                    <a:bodyPr/>
+                    <a:lstStyle/>
+                    <a:p>
+                      <a:endParaRPr lang="en-IN" dirty="0"/>
+                    </a:p>
+                  </a:txBody>
+                  <a:tcPr/>
+                </a:tc>
+                <a:tc>
+                  <a:txBody>
+                    <a:bodyPr/>
+                    <a:lstStyle/>
+                    <a:p>
+                      <a:endParaRPr lang="en-IN"/>
+                    </a:p>
+                  </a:txBody>
+                  <a:tcPr/>
+                </a:tc>
+              </a:tr>
+              <a:tr h="370840">
+                <a:tc>
+                  <a:txBody>
+                    <a:bodyPr/>
+                    <a:lstStyle/>
+                    <a:p>
+                      <a:endParaRPr lang="en-IN"/>
+                    </a:p>
+                  </a:txBody>
+                  <a:tcPr/>
+                </a:tc>
+                <a:tc>
+                  <a:txBody>
+                    <a:bodyPr/>
+                    <a:lstStyle/>
+                    <a:p>
+                      <a:endParaRPr lang="en-IN"/>
+                    </a:p>
+                  </a:txBody>
+                  <a:tcPr/>
+                </a:tc>
+              </a:tr>
+              <a:tr h="370840">
+                <a:tc>
+                  <a:txBody>
+                    <a:bodyPr/>
+                    <a:lstStyle/>
+                    <a:p>
+                      <a:endParaRPr lang="en-IN"/>
+                    </a:p>
+                  </a:txBody>
+                  <a:tcPr/>
+                </a:tc>
+                <a:tc>
+                  <a:txBody>
+                    <a:bodyPr/>
+                    <a:lstStyle/>
+                    <a:p>
+                      <a:endParaRPr lang="en-IN"/>
+                    </a:p>
+                  </a:txBody>
+                  <a:tcPr/>
+                </a:tc>
+              </a:tr>
+              <a:tr h="370840">
+                <a:tc>
+                  <a:txBody>
+                    <a:bodyPr/>
+                    <a:lstStyle/>
+                    <a:p>
+                      <a:endParaRPr lang="en-IN"/>
+                    </a:p>
+                  </a:txBody>
+                  <a:tcPr/>
+                </a:tc>
+                <a:tc>
+                  <a:txBody>
+                    <a:bodyPr/>
+                    <a:lstStyle/>
+                    <a:p>
+                      <a:endParaRPr lang="en-IN"/>
+                    </a:p>
+                  </a:txBody>
+                  <a:tcPr/>
+                </a:tc>
+              </a:tr>
+              <a:tr h="370840">
+                <a:tc>
+                  <a:txBody>
+                    <a:bodyPr/>
+                    <a:lstStyle/>
+                    <a:p>
+                      <a:endParaRPr lang="en-IN"/>
+                    </a:p>
+                  </a:txBody>
+                  <a:tcPr/>
+                </a:tc>
+                <a:tc>
+                  <a:txBody>
+                    <a:bodyPr/>
+                    <a:lstStyle/>
+                    <a:p>
+                      <a:endParaRPr lang="en-IN"/>
+                    </a:p>
+                  </a:txBody>
+                  <a:tcPr/>
+                </a:tc>
+              </a:tr>
+              <a:tr h="370840">
+                <a:tc>
+                  <a:txBody>
+                    <a:bodyPr/>
+                    <a:lstStyle/>
+                    <a:p>
+                      <a:endParaRPr lang="en-IN"/>
+                    </a:p>
+                  </a:txBody>
+                  <a:tcPr/>
+                </a:tc>
+                <a:tc>
+                  <a:txBody>
+                    <a:bodyPr/>
+                    <a:lstStyle/>
+                    <a:p>
+                      <a:endParaRPr lang="en-IN" dirty="0"/>
+                    </a:p>
+                  </a:txBody>
+                  <a:tcPr/>
+                </a:tc>
+              </a:tr>
+            </a:tbl>
+          </a:graphicData>
+        </a:graphic>
+      </p:graphicFrame>
+    </p:spTree>
+    <p:extLst>
+      <p:ext uri="{BB962C8B-B14F-4D97-AF65-F5344CB8AC3E}">
+        <p14:creationId xmlns:p14="http://schemas.microsoft.com/office/powerpoint/2010/main" val="1790103234"/>
       </p:ext>
     </p:extLst>
   </p:cSld>

</xml_diff>